<commit_message>
uploading final powerpoint version
</commit_message>
<xml_diff>
--- a/NLPCHEF.pptx
+++ b/NLPCHEF.pptx
@@ -6,15 +6,14 @@
   </p:sldMasterIdLst>
   <p:sldIdLst>
     <p:sldId id="256" r:id="rId2"/>
-    <p:sldId id="257" r:id="rId3"/>
-    <p:sldId id="258" r:id="rId4"/>
-    <p:sldId id="259" r:id="rId5"/>
-    <p:sldId id="261" r:id="rId6"/>
-    <p:sldId id="260" r:id="rId7"/>
-    <p:sldId id="266" r:id="rId8"/>
+    <p:sldId id="258" r:id="rId3"/>
+    <p:sldId id="259" r:id="rId4"/>
+    <p:sldId id="261" r:id="rId5"/>
+    <p:sldId id="260" r:id="rId6"/>
+    <p:sldId id="266" r:id="rId7"/>
+    <p:sldId id="265" r:id="rId8"/>
     <p:sldId id="262" r:id="rId9"/>
-    <p:sldId id="265" r:id="rId10"/>
-    <p:sldId id="264" r:id="rId11"/>
+    <p:sldId id="264" r:id="rId10"/>
   </p:sldIdLst>
   <p:sldSz cx="12192000" cy="6858000"/>
   <p:notesSz cx="6858000" cy="9144000"/>
@@ -134,10 +133,17 @@
   <pc:docChgLst>
     <pc:chgData name="tim holthuijsen" userId="c2227180cd231e55" providerId="LiveId" clId="{F5413509-B855-4530-A57A-94C55BBCA9EF}"/>
     <pc:docChg chg="custSel addSld delSld modSld sldOrd">
-      <pc:chgData name="tim holthuijsen" userId="c2227180cd231e55" providerId="LiveId" clId="{F5413509-B855-4530-A57A-94C55BBCA9EF}" dt="2021-05-17T12:00:08.796" v="554" actId="404"/>
+      <pc:chgData name="tim holthuijsen" userId="c2227180cd231e55" providerId="LiveId" clId="{F5413509-B855-4530-A57A-94C55BBCA9EF}" dt="2021-05-17T12:11:21.873" v="604" actId="1076"/>
       <pc:docMkLst>
         <pc:docMk/>
       </pc:docMkLst>
+      <pc:sldChg chg="del">
+        <pc:chgData name="tim holthuijsen" userId="c2227180cd231e55" providerId="LiveId" clId="{F5413509-B855-4530-A57A-94C55BBCA9EF}" dt="2021-05-17T12:08:48.061" v="573" actId="47"/>
+        <pc:sldMkLst>
+          <pc:docMk/>
+          <pc:sldMk cId="2995910110" sldId="257"/>
+        </pc:sldMkLst>
+      </pc:sldChg>
       <pc:sldChg chg="ord">
         <pc:chgData name="tim holthuijsen" userId="c2227180cd231e55" providerId="LiveId" clId="{F5413509-B855-4530-A57A-94C55BBCA9EF}" dt="2021-05-17T11:29:05.256" v="1"/>
         <pc:sldMkLst>
@@ -146,7 +152,7 @@
         </pc:sldMkLst>
       </pc:sldChg>
       <pc:sldChg chg="addSp modSp mod ord">
-        <pc:chgData name="tim holthuijsen" userId="c2227180cd231e55" providerId="LiveId" clId="{F5413509-B855-4530-A57A-94C55BBCA9EF}" dt="2021-05-17T11:38:43.984" v="49" actId="20577"/>
+        <pc:chgData name="tim holthuijsen" userId="c2227180cd231e55" providerId="LiveId" clId="{F5413509-B855-4530-A57A-94C55BBCA9EF}" dt="2021-05-17T12:09:41.109" v="577" actId="1076"/>
         <pc:sldMkLst>
           <pc:docMk/>
           <pc:sldMk cId="3879942516" sldId="260"/>
@@ -160,7 +166,7 @@
           </ac:spMkLst>
         </pc:spChg>
         <pc:spChg chg="add mod">
-          <ac:chgData name="tim holthuijsen" userId="c2227180cd231e55" providerId="LiveId" clId="{F5413509-B855-4530-A57A-94C55BBCA9EF}" dt="2021-05-17T11:38:12.675" v="30" actId="1076"/>
+          <ac:chgData name="tim holthuijsen" userId="c2227180cd231e55" providerId="LiveId" clId="{F5413509-B855-4530-A57A-94C55BBCA9EF}" dt="2021-05-17T12:09:27.720" v="574" actId="1076"/>
           <ac:spMkLst>
             <pc:docMk/>
             <pc:sldMk cId="3879942516" sldId="260"/>
@@ -168,7 +174,7 @@
           </ac:spMkLst>
         </pc:spChg>
         <pc:spChg chg="add mod">
-          <ac:chgData name="tim holthuijsen" userId="c2227180cd231e55" providerId="LiveId" clId="{F5413509-B855-4530-A57A-94C55BBCA9EF}" dt="2021-05-17T11:38:23.169" v="31" actId="1076"/>
+          <ac:chgData name="tim holthuijsen" userId="c2227180cd231e55" providerId="LiveId" clId="{F5413509-B855-4530-A57A-94C55BBCA9EF}" dt="2021-05-17T12:09:30.441" v="575" actId="1076"/>
           <ac:spMkLst>
             <pc:docMk/>
             <pc:sldMk cId="3879942516" sldId="260"/>
@@ -176,7 +182,7 @@
           </ac:spMkLst>
         </pc:spChg>
         <pc:picChg chg="add mod">
-          <ac:chgData name="tim holthuijsen" userId="c2227180cd231e55" providerId="LiveId" clId="{F5413509-B855-4530-A57A-94C55BBCA9EF}" dt="2021-05-17T11:38:26.024" v="32" actId="1076"/>
+          <ac:chgData name="tim holthuijsen" userId="c2227180cd231e55" providerId="LiveId" clId="{F5413509-B855-4530-A57A-94C55BBCA9EF}" dt="2021-05-17T12:09:41.109" v="577" actId="1076"/>
           <ac:picMkLst>
             <pc:docMk/>
             <pc:sldMk cId="3879942516" sldId="260"/>
@@ -184,12 +190,28 @@
           </ac:picMkLst>
         </pc:picChg>
       </pc:sldChg>
-      <pc:sldChg chg="ord">
-        <pc:chgData name="tim holthuijsen" userId="c2227180cd231e55" providerId="LiveId" clId="{F5413509-B855-4530-A57A-94C55BBCA9EF}" dt="2021-05-17T11:29:13.272" v="3"/>
+      <pc:sldChg chg="modSp mod ord">
+        <pc:chgData name="tim holthuijsen" userId="c2227180cd231e55" providerId="LiveId" clId="{F5413509-B855-4530-A57A-94C55BBCA9EF}" dt="2021-05-17T12:11:21.873" v="604" actId="1076"/>
         <pc:sldMkLst>
           <pc:docMk/>
           <pc:sldMk cId="2762963101" sldId="261"/>
         </pc:sldMkLst>
+        <pc:spChg chg="mod">
+          <ac:chgData name="tim holthuijsen" userId="c2227180cd231e55" providerId="LiveId" clId="{F5413509-B855-4530-A57A-94C55BBCA9EF}" dt="2021-05-17T12:11:02.524" v="602" actId="20577"/>
+          <ac:spMkLst>
+            <pc:docMk/>
+            <pc:sldMk cId="2762963101" sldId="261"/>
+            <ac:spMk id="2" creationId="{3B80D135-7C0B-42C9-B9CF-18F4F2BFA809}"/>
+          </ac:spMkLst>
+        </pc:spChg>
+        <pc:picChg chg="mod modCrop">
+          <ac:chgData name="tim holthuijsen" userId="c2227180cd231e55" providerId="LiveId" clId="{F5413509-B855-4530-A57A-94C55BBCA9EF}" dt="2021-05-17T12:11:21.873" v="604" actId="1076"/>
+          <ac:picMkLst>
+            <pc:docMk/>
+            <pc:sldMk cId="2762963101" sldId="261"/>
+            <ac:picMk id="8" creationId="{BB11F888-7B7E-4F37-B998-8624E76C9507}"/>
+          </ac:picMkLst>
+        </pc:picChg>
       </pc:sldChg>
       <pc:sldChg chg="addSp delSp modSp mod">
         <pc:chgData name="tim holthuijsen" userId="c2227180cd231e55" providerId="LiveId" clId="{F5413509-B855-4530-A57A-94C55BBCA9EF}" dt="2021-05-17T11:52:04.812" v="296" actId="478"/>
@@ -261,14 +283,14 @@
           <pc:sldMk cId="1432825462" sldId="263"/>
         </pc:sldMkLst>
       </pc:sldChg>
-      <pc:sldChg chg="modSp mod">
-        <pc:chgData name="tim holthuijsen" userId="c2227180cd231e55" providerId="LiveId" clId="{F5413509-B855-4530-A57A-94C55BBCA9EF}" dt="2021-05-17T11:54:12.591" v="453" actId="20577"/>
+      <pc:sldChg chg="modSp mod ord">
+        <pc:chgData name="tim holthuijsen" userId="c2227180cd231e55" providerId="LiveId" clId="{F5413509-B855-4530-A57A-94C55BBCA9EF}" dt="2021-05-17T12:05:51.502" v="572" actId="20577"/>
         <pc:sldMkLst>
           <pc:docMk/>
           <pc:sldMk cId="1986758681" sldId="265"/>
         </pc:sldMkLst>
         <pc:spChg chg="mod">
-          <ac:chgData name="tim holthuijsen" userId="c2227180cd231e55" providerId="LiveId" clId="{F5413509-B855-4530-A57A-94C55BBCA9EF}" dt="2021-05-17T11:48:40.651" v="250" actId="20577"/>
+          <ac:chgData name="tim holthuijsen" userId="c2227180cd231e55" providerId="LiveId" clId="{F5413509-B855-4530-A57A-94C55BBCA9EF}" dt="2021-05-17T12:05:45.838" v="571" actId="20577"/>
           <ac:spMkLst>
             <pc:docMk/>
             <pc:sldMk cId="1986758681" sldId="265"/>
@@ -276,7 +298,7 @@
           </ac:spMkLst>
         </pc:spChg>
         <pc:spChg chg="mod">
-          <ac:chgData name="tim holthuijsen" userId="c2227180cd231e55" providerId="LiveId" clId="{F5413509-B855-4530-A57A-94C55BBCA9EF}" dt="2021-05-17T11:54:12.591" v="453" actId="20577"/>
+          <ac:chgData name="tim holthuijsen" userId="c2227180cd231e55" providerId="LiveId" clId="{F5413509-B855-4530-A57A-94C55BBCA9EF}" dt="2021-05-17T12:05:51.502" v="572" actId="20577"/>
           <ac:spMkLst>
             <pc:docMk/>
             <pc:sldMk cId="1986758681" sldId="265"/>
@@ -7112,263 +7134,7 @@
 </p:sld>
 </file>
 
-<file path=ppt/slides/slide10.xml><?xml version="1.0" encoding="utf-8"?>
-<p:sld xmlns:a="http://schemas.openxmlformats.org/drawingml/2006/main" xmlns:r="http://schemas.openxmlformats.org/officeDocument/2006/relationships" xmlns:p="http://schemas.openxmlformats.org/presentationml/2006/main">
-  <p:cSld>
-    <p:spTree>
-      <p:nvGrpSpPr>
-        <p:cNvPr id="1" name=""/>
-        <p:cNvGrpSpPr/>
-        <p:nvPr/>
-      </p:nvGrpSpPr>
-      <p:grpSpPr>
-        <a:xfrm>
-          <a:off x="0" y="0"/>
-          <a:ext cx="0" cy="0"/>
-          <a:chOff x="0" y="0"/>
-          <a:chExt cx="0" cy="0"/>
-        </a:xfrm>
-      </p:grpSpPr>
-      <p:sp>
-        <p:nvSpPr>
-          <p:cNvPr id="2" name="Titel 1">
-            <a:extLst>
-              <a:ext uri="{FF2B5EF4-FFF2-40B4-BE49-F238E27FC236}">
-                <a16:creationId xmlns:a16="http://schemas.microsoft.com/office/drawing/2014/main" id="{4166E0D6-2485-49DD-910A-A93D3048E4A4}"/>
-              </a:ext>
-            </a:extLst>
-          </p:cNvPr>
-          <p:cNvSpPr>
-            <a:spLocks noGrp="1"/>
-          </p:cNvSpPr>
-          <p:nvPr>
-            <p:ph type="title"/>
-          </p:nvPr>
-        </p:nvSpPr>
-        <p:spPr/>
-        <p:txBody>
-          <a:bodyPr/>
-          <a:lstStyle/>
-          <a:p>
-            <a:r>
-              <a:rPr lang="en-GB" dirty="0"/>
-              <a:t>Conclusion</a:t>
-            </a:r>
-            <a:endParaRPr lang="nl-NL" dirty="0"/>
-          </a:p>
-        </p:txBody>
-      </p:sp>
-      <p:sp>
-        <p:nvSpPr>
-          <p:cNvPr id="3" name="Tijdelijke aanduiding voor inhoud 2">
-            <a:extLst>
-              <a:ext uri="{FF2B5EF4-FFF2-40B4-BE49-F238E27FC236}">
-                <a16:creationId xmlns:a16="http://schemas.microsoft.com/office/drawing/2014/main" id="{D21A0736-74D0-4707-BF9D-D53E985CE0FA}"/>
-              </a:ext>
-            </a:extLst>
-          </p:cNvPr>
-          <p:cNvSpPr>
-            <a:spLocks noGrp="1"/>
-          </p:cNvSpPr>
-          <p:nvPr>
-            <p:ph idx="1"/>
-          </p:nvPr>
-        </p:nvSpPr>
-        <p:spPr/>
-        <p:txBody>
-          <a:bodyPr/>
-          <a:lstStyle/>
-          <a:p>
-            <a:r>
-              <a:rPr lang="en-GB" dirty="0"/>
-              <a:t>The GPT-model versus our custom model</a:t>
-            </a:r>
-          </a:p>
-          <a:p>
-            <a:r>
-              <a:rPr lang="en-GB" dirty="0"/>
-              <a:t>Could it create cookbooks?</a:t>
-            </a:r>
-          </a:p>
-          <a:p>
-            <a:endParaRPr lang="nl-NL" dirty="0"/>
-          </a:p>
-          <a:p>
-            <a:endParaRPr lang="nl-NL" dirty="0"/>
-          </a:p>
-        </p:txBody>
-      </p:sp>
-      <p:pic>
-        <p:nvPicPr>
-          <p:cNvPr id="5" name="Afbeelding 4">
-            <a:extLst>
-              <a:ext uri="{FF2B5EF4-FFF2-40B4-BE49-F238E27FC236}">
-                <a16:creationId xmlns:a16="http://schemas.microsoft.com/office/drawing/2014/main" id="{3D3FA4BE-A07B-4AF4-8458-78A1F0E5D877}"/>
-              </a:ext>
-            </a:extLst>
-          </p:cNvPr>
-          <p:cNvPicPr>
-            <a:picLocks noChangeAspect="1"/>
-          </p:cNvPicPr>
-          <p:nvPr/>
-        </p:nvPicPr>
-        <p:blipFill>
-          <a:blip r:embed="rId2">
-            <a:extLst>
-              <a:ext uri="{28A0092B-C50C-407E-A947-70E740481C1C}">
-                <a14:useLocalDpi xmlns:a14="http://schemas.microsoft.com/office/drawing/2010/main" val="0"/>
-              </a:ext>
-            </a:extLst>
-          </a:blip>
-          <a:stretch>
-            <a:fillRect/>
-          </a:stretch>
-        </p:blipFill>
-        <p:spPr>
-          <a:xfrm>
-            <a:off x="7429066" y="3429000"/>
-            <a:ext cx="2359170" cy="3011706"/>
-          </a:xfrm>
-          <a:prstGeom prst="rect">
-            <a:avLst/>
-          </a:prstGeom>
-        </p:spPr>
-      </p:pic>
-    </p:spTree>
-    <p:extLst>
-      <p:ext uri="{BB962C8B-B14F-4D97-AF65-F5344CB8AC3E}">
-        <p14:creationId xmlns:p14="http://schemas.microsoft.com/office/powerpoint/2010/main" val="3779194090"/>
-      </p:ext>
-    </p:extLst>
-  </p:cSld>
-  <p:clrMapOvr>
-    <a:masterClrMapping/>
-  </p:clrMapOvr>
-</p:sld>
-</file>
-
 <file path=ppt/slides/slide2.xml><?xml version="1.0" encoding="utf-8"?>
-<p:sld xmlns:a="http://schemas.openxmlformats.org/drawingml/2006/main" xmlns:r="http://schemas.openxmlformats.org/officeDocument/2006/relationships" xmlns:p="http://schemas.openxmlformats.org/presentationml/2006/main">
-  <p:cSld>
-    <p:spTree>
-      <p:nvGrpSpPr>
-        <p:cNvPr id="1" name=""/>
-        <p:cNvGrpSpPr/>
-        <p:nvPr/>
-      </p:nvGrpSpPr>
-      <p:grpSpPr>
-        <a:xfrm>
-          <a:off x="0" y="0"/>
-          <a:ext cx="0" cy="0"/>
-          <a:chOff x="0" y="0"/>
-          <a:chExt cx="0" cy="0"/>
-        </a:xfrm>
-      </p:grpSpPr>
-      <p:sp>
-        <p:nvSpPr>
-          <p:cNvPr id="2" name="Titel 1">
-            <a:extLst>
-              <a:ext uri="{FF2B5EF4-FFF2-40B4-BE49-F238E27FC236}">
-                <a16:creationId xmlns:a16="http://schemas.microsoft.com/office/drawing/2014/main" id="{3F748336-1069-4858-BD0F-C9089B2F588A}"/>
-              </a:ext>
-            </a:extLst>
-          </p:cNvPr>
-          <p:cNvSpPr>
-            <a:spLocks noGrp="1"/>
-          </p:cNvSpPr>
-          <p:nvPr>
-            <p:ph type="title"/>
-          </p:nvPr>
-        </p:nvSpPr>
-        <p:spPr/>
-        <p:txBody>
-          <a:bodyPr/>
-          <a:lstStyle/>
-          <a:p>
-            <a:r>
-              <a:rPr lang="en-GB" dirty="0"/>
-              <a:t>Contents</a:t>
-            </a:r>
-            <a:endParaRPr lang="nl-NL" dirty="0"/>
-          </a:p>
-        </p:txBody>
-      </p:sp>
-      <p:sp>
-        <p:nvSpPr>
-          <p:cNvPr id="3" name="Tijdelijke aanduiding voor inhoud 2">
-            <a:extLst>
-              <a:ext uri="{FF2B5EF4-FFF2-40B4-BE49-F238E27FC236}">
-                <a16:creationId xmlns:a16="http://schemas.microsoft.com/office/drawing/2014/main" id="{87CAF737-2E04-4EDD-9D0B-DE4227DB3105}"/>
-              </a:ext>
-            </a:extLst>
-          </p:cNvPr>
-          <p:cNvSpPr>
-            <a:spLocks noGrp="1"/>
-          </p:cNvSpPr>
-          <p:nvPr>
-            <p:ph idx="1"/>
-          </p:nvPr>
-        </p:nvSpPr>
-        <p:spPr/>
-        <p:txBody>
-          <a:bodyPr>
-            <a:normAutofit/>
-          </a:bodyPr>
-          <a:lstStyle/>
-          <a:p>
-            <a:r>
-              <a:rPr lang="en-GB" dirty="0"/>
-              <a:t>Our project</a:t>
-            </a:r>
-          </a:p>
-          <a:p>
-            <a:r>
-              <a:rPr lang="nl-NL" dirty="0"/>
-              <a:t>Datasets</a:t>
-            </a:r>
-            <a:endParaRPr lang="en-GB" dirty="0"/>
-          </a:p>
-          <a:p>
-            <a:r>
-              <a:rPr lang="en-GB" dirty="0"/>
-              <a:t>GPT-2 model</a:t>
-            </a:r>
-          </a:p>
-          <a:p>
-            <a:r>
-              <a:rPr lang="en-GB" dirty="0"/>
-              <a:t>Custom model</a:t>
-            </a:r>
-          </a:p>
-          <a:p>
-            <a:r>
-              <a:rPr lang="nl-NL" dirty="0"/>
-              <a:t>Results</a:t>
-            </a:r>
-          </a:p>
-          <a:p>
-            <a:r>
-              <a:rPr lang="nl-NL" dirty="0" err="1"/>
-              <a:t>Conclusion</a:t>
-            </a:r>
-            <a:endParaRPr lang="nl-NL" dirty="0"/>
-          </a:p>
-        </p:txBody>
-      </p:sp>
-    </p:spTree>
-    <p:extLst>
-      <p:ext uri="{BB962C8B-B14F-4D97-AF65-F5344CB8AC3E}">
-        <p14:creationId xmlns:p14="http://schemas.microsoft.com/office/powerpoint/2010/main" val="2995910110"/>
-      </p:ext>
-    </p:extLst>
-  </p:cSld>
-  <p:clrMapOvr>
-    <a:masterClrMapping/>
-  </p:clrMapOvr>
-</p:sld>
-</file>
-
-<file path=ppt/slides/slide3.xml><?xml version="1.0" encoding="utf-8"?>
 <p:sld xmlns:a="http://schemas.openxmlformats.org/drawingml/2006/main" xmlns:r="http://schemas.openxmlformats.org/officeDocument/2006/relationships" xmlns:p="http://schemas.openxmlformats.org/presentationml/2006/main">
   <p:cSld>
     <p:spTree>
@@ -7515,7 +7281,7 @@
 </p:sld>
 </file>
 
-<file path=ppt/slides/slide4.xml><?xml version="1.0" encoding="utf-8"?>
+<file path=ppt/slides/slide3.xml><?xml version="1.0" encoding="utf-8"?>
 <p:sld xmlns:a="http://schemas.openxmlformats.org/drawingml/2006/main" xmlns:r="http://schemas.openxmlformats.org/officeDocument/2006/relationships" xmlns:p="http://schemas.openxmlformats.org/presentationml/2006/main">
   <p:cSld>
     <p:spTree>
@@ -7666,7 +7432,7 @@
 </p:sld>
 </file>
 
-<file path=ppt/slides/slide5.xml><?xml version="1.0" encoding="utf-8"?>
+<file path=ppt/slides/slide4.xml><?xml version="1.0" encoding="utf-8"?>
 <p:sld xmlns:a="http://schemas.openxmlformats.org/drawingml/2006/main" xmlns:r="http://schemas.openxmlformats.org/officeDocument/2006/relationships" xmlns:p="http://schemas.openxmlformats.org/presentationml/2006/main">
   <p:cSld>
     <p:spTree>
@@ -7706,7 +7472,7 @@
           <a:p>
             <a:r>
               <a:rPr lang="nl-NL" dirty="0"/>
-              <a:t>Results</a:t>
+              <a:t>GPt-2 Performance</a:t>
             </a:r>
             <a:br>
               <a:rPr lang="nl-NL" dirty="0"/>
@@ -7765,16 +7531,15 @@
           </p:cNvPicPr>
           <p:nvPr/>
         </p:nvPicPr>
-        <p:blipFill>
+        <p:blipFill rotWithShape="1">
           <a:blip r:embed="rId2"/>
-          <a:stretch>
-            <a:fillRect/>
-          </a:stretch>
+          <a:srcRect t="27469"/>
+          <a:stretch/>
         </p:blipFill>
         <p:spPr>
           <a:xfrm>
-            <a:off x="1251678" y="2572775"/>
-            <a:ext cx="8482445" cy="4285225"/>
+            <a:off x="1251678" y="2683005"/>
+            <a:ext cx="8482445" cy="3108121"/>
           </a:xfrm>
           <a:prstGeom prst="rect">
             <a:avLst/>
@@ -7794,7 +7559,7 @@
 </p:sld>
 </file>
 
-<file path=ppt/slides/slide6.xml><?xml version="1.0" encoding="utf-8"?>
+<file path=ppt/slides/slide5.xml><?xml version="1.0" encoding="utf-8"?>
 <p:sld xmlns:a="http://schemas.openxmlformats.org/drawingml/2006/main" xmlns:r="http://schemas.openxmlformats.org/officeDocument/2006/relationships" xmlns:p="http://schemas.openxmlformats.org/presentationml/2006/main">
   <p:cSld>
     <p:spTree>
@@ -7917,7 +7682,7 @@
         </p:nvSpPr>
         <p:spPr>
           <a:xfrm>
-            <a:off x="5758194" y="3514729"/>
+            <a:off x="7050099" y="3521209"/>
             <a:ext cx="2382474" cy="461665"/>
           </a:xfrm>
           <a:prstGeom prst="rect">
@@ -7952,7 +7717,7 @@
         </p:nvSpPr>
         <p:spPr>
           <a:xfrm>
-            <a:off x="3902130" y="4057388"/>
+            <a:off x="5194035" y="4056273"/>
             <a:ext cx="6094602" cy="369332"/>
           </a:xfrm>
           <a:prstGeom prst="rect">
@@ -7995,7 +7760,7 @@
         </p:blipFill>
         <p:spPr>
           <a:xfrm>
-            <a:off x="3070506" y="4498107"/>
+            <a:off x="4152686" y="4499004"/>
             <a:ext cx="7757850" cy="1414030"/>
           </a:xfrm>
           <a:prstGeom prst="rect">
@@ -8016,7 +7781,7 @@
 </p:sld>
 </file>
 
-<file path=ppt/slides/slide7.xml><?xml version="1.0" encoding="utf-8"?>
+<file path=ppt/slides/slide6.xml><?xml version="1.0" encoding="utf-8"?>
 <p:sld xmlns:a="http://schemas.openxmlformats.org/drawingml/2006/main" xmlns:r="http://schemas.openxmlformats.org/officeDocument/2006/relationships" xmlns:p="http://schemas.openxmlformats.org/presentationml/2006/main">
   <p:cSld>
     <p:spTree>
@@ -8214,6 +7979,113 @@
     <p:extLst>
       <p:ext uri="{BB962C8B-B14F-4D97-AF65-F5344CB8AC3E}">
         <p14:creationId xmlns:p14="http://schemas.microsoft.com/office/powerpoint/2010/main" val="2627378406"/>
+      </p:ext>
+    </p:extLst>
+  </p:cSld>
+  <p:clrMapOvr>
+    <a:masterClrMapping/>
+  </p:clrMapOvr>
+</p:sld>
+</file>
+
+<file path=ppt/slides/slide7.xml><?xml version="1.0" encoding="utf-8"?>
+<p:sld xmlns:a="http://schemas.openxmlformats.org/drawingml/2006/main" xmlns:r="http://schemas.openxmlformats.org/officeDocument/2006/relationships" xmlns:p="http://schemas.openxmlformats.org/presentationml/2006/main">
+  <p:cSld>
+    <p:spTree>
+      <p:nvGrpSpPr>
+        <p:cNvPr id="1" name=""/>
+        <p:cNvGrpSpPr/>
+        <p:nvPr/>
+      </p:nvGrpSpPr>
+      <p:grpSpPr>
+        <a:xfrm>
+          <a:off x="0" y="0"/>
+          <a:ext cx="0" cy="0"/>
+          <a:chOff x="0" y="0"/>
+          <a:chExt cx="0" cy="0"/>
+        </a:xfrm>
+      </p:grpSpPr>
+      <p:sp>
+        <p:nvSpPr>
+          <p:cNvPr id="2" name="Titel 1">
+            <a:extLst>
+              <a:ext uri="{FF2B5EF4-FFF2-40B4-BE49-F238E27FC236}">
+                <a16:creationId xmlns:a16="http://schemas.microsoft.com/office/drawing/2014/main" id="{41F68558-FF58-4081-A07F-85CB64DB8F02}"/>
+              </a:ext>
+            </a:extLst>
+          </p:cNvPr>
+          <p:cNvSpPr>
+            <a:spLocks noGrp="1"/>
+          </p:cNvSpPr>
+          <p:nvPr>
+            <p:ph type="title"/>
+          </p:nvPr>
+        </p:nvSpPr>
+        <p:spPr/>
+        <p:txBody>
+          <a:bodyPr/>
+          <a:lstStyle/>
+          <a:p>
+            <a:r>
+              <a:rPr lang="en-GB" dirty="0"/>
+              <a:t>Hyperparameters</a:t>
+            </a:r>
+            <a:br>
+              <a:rPr lang="en-GB" dirty="0"/>
+            </a:br>
+            <a:endParaRPr lang="nl-NL" dirty="0"/>
+          </a:p>
+        </p:txBody>
+      </p:sp>
+      <p:sp>
+        <p:nvSpPr>
+          <p:cNvPr id="3" name="Tijdelijke aanduiding voor inhoud 2">
+            <a:extLst>
+              <a:ext uri="{FF2B5EF4-FFF2-40B4-BE49-F238E27FC236}">
+                <a16:creationId xmlns:a16="http://schemas.microsoft.com/office/drawing/2014/main" id="{7C57D791-84EC-4B63-A260-96837B3978DD}"/>
+              </a:ext>
+            </a:extLst>
+          </p:cNvPr>
+          <p:cNvSpPr>
+            <a:spLocks noGrp="1"/>
+          </p:cNvSpPr>
+          <p:nvPr>
+            <p:ph idx="1"/>
+          </p:nvPr>
+        </p:nvSpPr>
+        <p:spPr/>
+        <p:txBody>
+          <a:bodyPr/>
+          <a:lstStyle/>
+          <a:p>
+            <a:r>
+              <a:rPr lang="nl-NL" dirty="0" err="1"/>
+              <a:t>Transformer</a:t>
+            </a:r>
+            <a:r>
+              <a:rPr lang="nl-NL" dirty="0"/>
+              <a:t> model</a:t>
+            </a:r>
+          </a:p>
+          <a:p>
+            <a:r>
+              <a:rPr lang="nl-NL" dirty="0"/>
+              <a:t>Top-K Sampling</a:t>
+            </a:r>
+          </a:p>
+          <a:p>
+            <a:r>
+              <a:rPr lang="nl-NL" dirty="0" err="1"/>
+              <a:t>Temperature</a:t>
+            </a:r>
+            <a:endParaRPr lang="nl-NL" dirty="0"/>
+          </a:p>
+        </p:txBody>
+      </p:sp>
+    </p:spTree>
+    <p:extLst>
+      <p:ext uri="{BB962C8B-B14F-4D97-AF65-F5344CB8AC3E}">
+        <p14:creationId xmlns:p14="http://schemas.microsoft.com/office/powerpoint/2010/main" val="1986758681"/>
       </p:ext>
     </p:extLst>
   </p:cSld>
@@ -9276,7 +9148,7 @@
           <p:cNvPr id="2" name="Titel 1">
             <a:extLst>
               <a:ext uri="{FF2B5EF4-FFF2-40B4-BE49-F238E27FC236}">
-                <a16:creationId xmlns:a16="http://schemas.microsoft.com/office/drawing/2014/main" id="{41F68558-FF58-4081-A07F-85CB64DB8F02}"/>
+                <a16:creationId xmlns:a16="http://schemas.microsoft.com/office/drawing/2014/main" id="{4166E0D6-2485-49DD-910A-A93D3048E4A4}"/>
               </a:ext>
             </a:extLst>
           </p:cNvPr>
@@ -9294,11 +9166,8 @@
           <a:p>
             <a:r>
               <a:rPr lang="en-GB" dirty="0"/>
-              <a:t>Results</a:t>
-            </a:r>
-            <a:br>
-              <a:rPr lang="en-GB" dirty="0"/>
-            </a:br>
+              <a:t>Conclusion</a:t>
+            </a:r>
             <a:endParaRPr lang="nl-NL" dirty="0"/>
           </a:p>
         </p:txBody>
@@ -9308,7 +9177,7 @@
           <p:cNvPr id="3" name="Tijdelijke aanduiding voor inhoud 2">
             <a:extLst>
               <a:ext uri="{FF2B5EF4-FFF2-40B4-BE49-F238E27FC236}">
-                <a16:creationId xmlns:a16="http://schemas.microsoft.com/office/drawing/2014/main" id="{7C57D791-84EC-4B63-A260-96837B3978DD}"/>
+                <a16:creationId xmlns:a16="http://schemas.microsoft.com/office/drawing/2014/main" id="{D21A0736-74D0-4707-BF9D-D53E985CE0FA}"/>
               </a:ext>
             </a:extLst>
           </p:cNvPr>
@@ -9325,68 +9194,64 @@
           <a:lstStyle/>
           <a:p>
             <a:r>
-              <a:rPr lang="nl-NL" dirty="0"/>
-              <a:t>GPT-</a:t>
-            </a:r>
-            <a:r>
-              <a:rPr lang="nl-NL" dirty="0" err="1"/>
-              <a:t>Recipe</a:t>
-            </a:r>
-            <a:r>
-              <a:rPr lang="nl-NL" dirty="0"/>
-              <a:t> </a:t>
-            </a:r>
-            <a:r>
-              <a:rPr lang="nl-NL" dirty="0" err="1"/>
-              <a:t>vs</a:t>
-            </a:r>
-            <a:r>
-              <a:rPr lang="nl-NL" dirty="0"/>
-              <a:t> </a:t>
-            </a:r>
-            <a:r>
-              <a:rPr lang="nl-NL" dirty="0" err="1"/>
-              <a:t>Custom</a:t>
-            </a:r>
-            <a:r>
-              <a:rPr lang="nl-NL" dirty="0"/>
-              <a:t> </a:t>
-            </a:r>
-            <a:r>
-              <a:rPr lang="nl-NL" dirty="0" err="1"/>
-              <a:t>Recipe</a:t>
-            </a:r>
+              <a:rPr lang="en-GB" dirty="0"/>
+              <a:t>The GPT-model versus our custom model</a:t>
+            </a:r>
+          </a:p>
+          <a:p>
+            <a:r>
+              <a:rPr lang="en-GB" dirty="0"/>
+              <a:t>Could it create cookbooks?</a:t>
+            </a:r>
+          </a:p>
+          <a:p>
             <a:endParaRPr lang="nl-NL" dirty="0"/>
           </a:p>
           <a:p>
-            <a:r>
-              <a:rPr lang="nl-NL" dirty="0" err="1"/>
-              <a:t>Transformer</a:t>
-            </a:r>
-            <a:r>
-              <a:rPr lang="nl-NL" dirty="0"/>
-              <a:t> model</a:t>
-            </a:r>
-          </a:p>
-          <a:p>
-            <a:r>
-              <a:rPr lang="nl-NL" dirty="0"/>
-              <a:t>Top-K Sampling</a:t>
-            </a:r>
-          </a:p>
-          <a:p>
-            <a:r>
-              <a:rPr lang="nl-NL" dirty="0" err="1"/>
-              <a:t>Temperature</a:t>
-            </a:r>
             <a:endParaRPr lang="nl-NL" dirty="0"/>
           </a:p>
         </p:txBody>
       </p:sp>
+      <p:pic>
+        <p:nvPicPr>
+          <p:cNvPr id="5" name="Afbeelding 4">
+            <a:extLst>
+              <a:ext uri="{FF2B5EF4-FFF2-40B4-BE49-F238E27FC236}">
+                <a16:creationId xmlns:a16="http://schemas.microsoft.com/office/drawing/2014/main" id="{3D3FA4BE-A07B-4AF4-8458-78A1F0E5D877}"/>
+              </a:ext>
+            </a:extLst>
+          </p:cNvPr>
+          <p:cNvPicPr>
+            <a:picLocks noChangeAspect="1"/>
+          </p:cNvPicPr>
+          <p:nvPr/>
+        </p:nvPicPr>
+        <p:blipFill>
+          <a:blip r:embed="rId2">
+            <a:extLst>
+              <a:ext uri="{28A0092B-C50C-407E-A947-70E740481C1C}">
+                <a14:useLocalDpi xmlns:a14="http://schemas.microsoft.com/office/drawing/2010/main" val="0"/>
+              </a:ext>
+            </a:extLst>
+          </a:blip>
+          <a:stretch>
+            <a:fillRect/>
+          </a:stretch>
+        </p:blipFill>
+        <p:spPr>
+          <a:xfrm>
+            <a:off x="7429066" y="3429000"/>
+            <a:ext cx="2359170" cy="3011706"/>
+          </a:xfrm>
+          <a:prstGeom prst="rect">
+            <a:avLst/>
+          </a:prstGeom>
+        </p:spPr>
+      </p:pic>
     </p:spTree>
     <p:extLst>
       <p:ext uri="{BB962C8B-B14F-4D97-AF65-F5344CB8AC3E}">
-        <p14:creationId xmlns:p14="http://schemas.microsoft.com/office/powerpoint/2010/main" val="1986758681"/>
+        <p14:creationId xmlns:p14="http://schemas.microsoft.com/office/powerpoint/2010/main" val="3779194090"/>
       </p:ext>
     </p:extLst>
   </p:cSld>

</xml_diff>